<commit_message>
update Shi et al. data
</commit_message>
<xml_diff>
--- a/China/Shi-etal_2020/Shi-etal_fig-extract.pptx
+++ b/China/Shi-etal_2020/Shi-etal_fig-extract.pptx
@@ -8687,12 +8687,8 @@
           <a:lstStyle/>
           <a:p>
             <a:r>
-              <a:rPr lang="en-US"/>
-              <a:t>Clinically diagnosed </a:t>
-            </a:r>
-            <a:r>
               <a:rPr lang="en-US" dirty="0"/>
-              <a:t>cases</a:t>
+              <a:t>Clinically diagnosed cases</a:t>
             </a:r>
           </a:p>
         </p:txBody>

</xml_diff>